<commit_message>
Atualização materiais pptx e docx
</commit_message>
<xml_diff>
--- a/Material/JavaEE_JSF.pptx
+++ b/Material/JavaEE_JSF.pptx
@@ -316,7 +316,7 @@
             <a:fld id="{D1E82135-54C0-4B8A-B743-CCB02E343503}" type="datetimeFigureOut">
               <a:rPr lang="en-US" smtClean="0"/>
               <a:pPr/>
-              <a:t>1/8/2017</a:t>
+              <a:t>1/9/2017</a:t>
             </a:fld>
             <a:endParaRPr lang="en-US"/>
           </a:p>
@@ -484,7 +484,7 @@
             <a:fld id="{2C77B33C-CEA4-4E38-B0AA-C477BF53CE9C}" type="datetimeFigureOut">
               <a:rPr lang="en-US" smtClean="0"/>
               <a:pPr/>
-              <a:t>1/8/2017</a:t>
+              <a:t>1/9/2017</a:t>
             </a:fld>
             <a:endParaRPr lang="en-US"/>
           </a:p>
@@ -4893,7 +4893,6 @@
               <a:rPr lang="pt-BR" dirty="0"/>
               <a:t> - JSF</a:t>
             </a:r>
-            <a:endParaRPr lang="pt-BR" dirty="0"/>
           </a:p>
         </p:txBody>
       </p:sp>
@@ -11736,13 +11735,8 @@
             </a:pPr>
             <a:r>
               <a:rPr lang="pt-BR" dirty="0"/>
-              <a:t>Invocar ação da </a:t>
-            </a:r>
-            <a:r>
-              <a:rPr lang="pt-BR" dirty="0" err="1"/>
-              <a:t>plicação</a:t>
-            </a:r>
-            <a:endParaRPr lang="pt-BR" dirty="0"/>
+              <a:t>Invocar ação da aplicação</a:t>
+            </a:r>
           </a:p>
           <a:p>
             <a:pPr lvl="1">
@@ -11758,18 +11752,18 @@
               <a:defRPr/>
             </a:pPr>
             <a:r>
-              <a:rPr lang="pt-BR" dirty="0" err="1"/>
+              <a:rPr lang="pt-BR" i="1" dirty="0" err="1"/>
               <a:t>Action</a:t>
             </a:r>
             <a:r>
-              <a:rPr lang="pt-BR" dirty="0"/>
+              <a:rPr lang="pt-BR" i="1" dirty="0"/>
               <a:t> </a:t>
             </a:r>
             <a:r>
-              <a:rPr lang="pt-BR" dirty="0" err="1"/>
+              <a:rPr lang="pt-BR" i="1" dirty="0" err="1"/>
               <a:t>handlers</a:t>
             </a:r>
-            <a:endParaRPr lang="pt-BR" dirty="0"/>
+            <a:endParaRPr lang="pt-BR" i="1" dirty="0"/>
           </a:p>
           <a:p>
             <a:pPr lvl="3">
@@ -11790,14 +11784,6 @@
             </a:r>
             <a:r>
               <a:rPr lang="pt-BR" i="1" dirty="0" err="1"/>
-              <a:t>backing</a:t>
-            </a:r>
-            <a:r>
-              <a:rPr lang="pt-BR" i="1" dirty="0"/>
-              <a:t> </a:t>
-            </a:r>
-            <a:r>
-              <a:rPr lang="pt-BR" i="1" dirty="0" err="1"/>
               <a:t>bean</a:t>
             </a:r>
             <a:endParaRPr lang="pt-BR" dirty="0"/>
@@ -11807,18 +11793,18 @@
               <a:defRPr/>
             </a:pPr>
             <a:r>
-              <a:rPr lang="pt-BR" dirty="0" err="1"/>
+              <a:rPr lang="pt-BR" i="1" dirty="0" err="1"/>
               <a:t>Event</a:t>
             </a:r>
             <a:r>
-              <a:rPr lang="pt-BR" dirty="0"/>
+              <a:rPr lang="pt-BR" i="1" dirty="0"/>
               <a:t> </a:t>
             </a:r>
             <a:r>
-              <a:rPr lang="pt-BR" dirty="0" err="1"/>
+              <a:rPr lang="pt-BR" i="1" dirty="0" err="1"/>
               <a:t>listeners</a:t>
             </a:r>
-            <a:endParaRPr lang="pt-BR" dirty="0"/>
+            <a:endParaRPr lang="pt-BR" i="1" dirty="0"/>
           </a:p>
           <a:p>
             <a:pPr lvl="3">
@@ -11857,14 +11843,6 @@
             <a:r>
               <a:rPr lang="pt-BR" dirty="0"/>
               <a:t>Declarados dentro de </a:t>
-            </a:r>
-            <a:r>
-              <a:rPr lang="pt-BR" i="1" dirty="0" err="1"/>
-              <a:t>backing</a:t>
-            </a:r>
-            <a:r>
-              <a:rPr lang="pt-BR" i="1" dirty="0"/>
-              <a:t> </a:t>
             </a:r>
             <a:r>
               <a:rPr lang="pt-BR" i="1" dirty="0" err="1"/>

</xml_diff>